<commit_message>
I think I finished these slides
</commit_message>
<xml_diff>
--- a/Meeting #1 Intro to Arduino/stpeteiot - meeting #1.pptx
+++ b/Meeting #1 Intro to Arduino/stpeteiot - meeting #1.pptx
@@ -17,7 +17,10 @@
     <p:sldId id="266" r:id="rId11"/>
     <p:sldId id="277" r:id="rId12"/>
     <p:sldId id="276" r:id="rId13"/>
-    <p:sldId id="267" r:id="rId14"/>
+    <p:sldId id="281" r:id="rId14"/>
+    <p:sldId id="267" r:id="rId15"/>
+    <p:sldId id="280" r:id="rId16"/>
+    <p:sldId id="282" r:id="rId17"/>
   </p:sldIdLst>
   <p:sldSz cx="12192000" cy="6858000"/>
   <p:notesSz cx="6858000" cy="9144000"/>
@@ -275,7 +278,7 @@
           <a:p>
             <a:fld id="{96F8FDAF-70E1-4658-93D8-51FF92779D9A}" type="datetimeFigureOut">
               <a:rPr lang="en-US" smtClean="0"/>
-              <a:t>12/20/2017</a:t>
+              <a:t>12/21/2017</a:t>
             </a:fld>
             <a:endParaRPr lang="en-US"/>
           </a:p>
@@ -473,7 +476,7 @@
           <a:p>
             <a:fld id="{96F8FDAF-70E1-4658-93D8-51FF92779D9A}" type="datetimeFigureOut">
               <a:rPr lang="en-US" smtClean="0"/>
-              <a:t>12/20/2017</a:t>
+              <a:t>12/21/2017</a:t>
             </a:fld>
             <a:endParaRPr lang="en-US"/>
           </a:p>
@@ -681,7 +684,7 @@
           <a:p>
             <a:fld id="{96F8FDAF-70E1-4658-93D8-51FF92779D9A}" type="datetimeFigureOut">
               <a:rPr lang="en-US" smtClean="0"/>
-              <a:t>12/20/2017</a:t>
+              <a:t>12/21/2017</a:t>
             </a:fld>
             <a:endParaRPr lang="en-US"/>
           </a:p>
@@ -879,7 +882,7 @@
           <a:p>
             <a:fld id="{96F8FDAF-70E1-4658-93D8-51FF92779D9A}" type="datetimeFigureOut">
               <a:rPr lang="en-US" smtClean="0"/>
-              <a:t>12/20/2017</a:t>
+              <a:t>12/21/2017</a:t>
             </a:fld>
             <a:endParaRPr lang="en-US"/>
           </a:p>
@@ -1154,7 +1157,7 @@
           <a:p>
             <a:fld id="{96F8FDAF-70E1-4658-93D8-51FF92779D9A}" type="datetimeFigureOut">
               <a:rPr lang="en-US" smtClean="0"/>
-              <a:t>12/20/2017</a:t>
+              <a:t>12/21/2017</a:t>
             </a:fld>
             <a:endParaRPr lang="en-US"/>
           </a:p>
@@ -1419,7 +1422,7 @@
           <a:p>
             <a:fld id="{96F8FDAF-70E1-4658-93D8-51FF92779D9A}" type="datetimeFigureOut">
               <a:rPr lang="en-US" smtClean="0"/>
-              <a:t>12/20/2017</a:t>
+              <a:t>12/21/2017</a:t>
             </a:fld>
             <a:endParaRPr lang="en-US"/>
           </a:p>
@@ -1831,7 +1834,7 @@
           <a:p>
             <a:fld id="{96F8FDAF-70E1-4658-93D8-51FF92779D9A}" type="datetimeFigureOut">
               <a:rPr lang="en-US" smtClean="0"/>
-              <a:t>12/20/2017</a:t>
+              <a:t>12/21/2017</a:t>
             </a:fld>
             <a:endParaRPr lang="en-US"/>
           </a:p>
@@ -1972,7 +1975,7 @@
           <a:p>
             <a:fld id="{96F8FDAF-70E1-4658-93D8-51FF92779D9A}" type="datetimeFigureOut">
               <a:rPr lang="en-US" smtClean="0"/>
-              <a:t>12/20/2017</a:t>
+              <a:t>12/21/2017</a:t>
             </a:fld>
             <a:endParaRPr lang="en-US"/>
           </a:p>
@@ -2085,7 +2088,7 @@
           <a:p>
             <a:fld id="{96F8FDAF-70E1-4658-93D8-51FF92779D9A}" type="datetimeFigureOut">
               <a:rPr lang="en-US" smtClean="0"/>
-              <a:t>12/20/2017</a:t>
+              <a:t>12/21/2017</a:t>
             </a:fld>
             <a:endParaRPr lang="en-US"/>
           </a:p>
@@ -2396,7 +2399,7 @@
           <a:p>
             <a:fld id="{96F8FDAF-70E1-4658-93D8-51FF92779D9A}" type="datetimeFigureOut">
               <a:rPr lang="en-US" smtClean="0"/>
-              <a:t>12/20/2017</a:t>
+              <a:t>12/21/2017</a:t>
             </a:fld>
             <a:endParaRPr lang="en-US"/>
           </a:p>
@@ -2684,7 +2687,7 @@
           <a:p>
             <a:fld id="{96F8FDAF-70E1-4658-93D8-51FF92779D9A}" type="datetimeFigureOut">
               <a:rPr lang="en-US" smtClean="0"/>
-              <a:t>12/20/2017</a:t>
+              <a:t>12/21/2017</a:t>
             </a:fld>
             <a:endParaRPr lang="en-US"/>
           </a:p>
@@ -2925,7 +2928,7 @@
           <a:p>
             <a:fld id="{96F8FDAF-70E1-4658-93D8-51FF92779D9A}" type="datetimeFigureOut">
               <a:rPr lang="en-US" smtClean="0"/>
-              <a:t>12/20/2017</a:t>
+              <a:t>12/21/2017</a:t>
             </a:fld>
             <a:endParaRPr lang="en-US"/>
           </a:p>
@@ -6181,10 +6184,1393 @@
           </a:p>
         </p:txBody>
       </p:sp>
+      <p:sp>
+        <p:nvSpPr>
+          <p:cNvPr id="2" name="Title 1">
+            <a:extLst>
+              <a:ext uri="{FF2B5EF4-FFF2-40B4-BE49-F238E27FC236}">
+                <a16:creationId xmlns:a16="http://schemas.microsoft.com/office/drawing/2014/main" xmlns="" id="{A5F6196D-B07E-499E-92C0-6953CE9F25D4}"/>
+              </a:ext>
+            </a:extLst>
+          </p:cNvPr>
+          <p:cNvSpPr>
+            <a:spLocks noGrp="1"/>
+          </p:cNvSpPr>
+          <p:nvPr>
+            <p:ph type="title"/>
+          </p:nvPr>
+        </p:nvSpPr>
+        <p:spPr>
+          <a:xfrm>
+            <a:off x="4499493" y="491532"/>
+            <a:ext cx="3187720" cy="774546"/>
+          </a:xfrm>
+        </p:spPr>
+        <p:txBody>
+          <a:bodyPr>
+            <a:normAutofit/>
+          </a:bodyPr>
+          <a:lstStyle/>
+          <a:p>
+            <a:pPr algn="ctr"/>
+            <a:r>
+              <a:rPr lang="en-US" b="1" smtClean="0"/>
+              <a:t>Comments</a:t>
+            </a:r>
+            <a:endParaRPr lang="en-US" b="1" dirty="0"/>
+          </a:p>
+        </p:txBody>
+      </p:sp>
+      <p:pic>
+        <p:nvPicPr>
+          <p:cNvPr id="3" name="Content Placeholder 2"/>
+          <p:cNvPicPr>
+            <a:picLocks noGrp="1" noChangeAspect="1"/>
+          </p:cNvPicPr>
+          <p:nvPr>
+            <p:ph idx="1"/>
+          </p:nvPr>
+        </p:nvPicPr>
+        <p:blipFill>
+          <a:blip r:embed="rId2">
+            <a:extLst>
+              <a:ext uri="{28A0092B-C50C-407E-A947-70E740481C1C}">
+                <a14:useLocalDpi xmlns:a14="http://schemas.microsoft.com/office/drawing/2010/main" val="0"/>
+              </a:ext>
+            </a:extLst>
+          </a:blip>
+          <a:stretch>
+            <a:fillRect/>
+          </a:stretch>
+        </p:blipFill>
+        <p:spPr>
+          <a:xfrm>
+            <a:off x="2452915" y="1585130"/>
+            <a:ext cx="6566356" cy="4679325"/>
+          </a:xfrm>
+        </p:spPr>
+      </p:pic>
+    </p:spTree>
+    <p:extLst>
+      <p:ext uri="{BB962C8B-B14F-4D97-AF65-F5344CB8AC3E}">
+        <p14:creationId xmlns:p14="http://schemas.microsoft.com/office/powerpoint/2010/main" val="1281611716"/>
+      </p:ext>
+    </p:extLst>
+  </p:cSld>
+  <p:clrMapOvr>
+    <a:overrideClrMapping bg1="dk1" tx1="lt1" bg2="dk2" tx2="lt2" accent1="accent1" accent2="accent2" accent3="accent3" accent4="accent4" accent5="accent5" accent6="accent6" hlink="hlink" folHlink="folHlink"/>
+  </p:clrMapOvr>
+  <p:timing>
+    <p:tnLst>
+      <p:par>
+        <p:cTn id="1" dur="indefinite" restart="never" nodeType="tmRoot"/>
+      </p:par>
+    </p:tnLst>
+  </p:timing>
+</p:sld>
+</file>
+
+<file path=ppt/slides/slide14.xml><?xml version="1.0" encoding="utf-8"?>
+<p:sld xmlns:a="http://schemas.openxmlformats.org/drawingml/2006/main" xmlns:r="http://schemas.openxmlformats.org/officeDocument/2006/relationships" xmlns:p="http://schemas.openxmlformats.org/presentationml/2006/main">
+  <p:cSld>
+    <p:bg>
+      <p:bgPr>
+        <a:solidFill>
+          <a:schemeClr val="bg1">
+            <a:tint val="95000"/>
+            <a:satMod val="170000"/>
+          </a:schemeClr>
+        </a:solidFill>
+        <a:effectLst/>
+      </p:bgPr>
+    </p:bg>
+    <p:spTree>
+      <p:nvGrpSpPr>
+        <p:cNvPr id="1" name=""/>
+        <p:cNvGrpSpPr/>
+        <p:nvPr/>
+      </p:nvGrpSpPr>
+      <p:grpSpPr>
+        <a:xfrm>
+          <a:off x="0" y="0"/>
+          <a:ext cx="0" cy="0"/>
+          <a:chOff x="0" y="0"/>
+          <a:chExt cx="0" cy="0"/>
+        </a:xfrm>
+      </p:grpSpPr>
+      <p:sp>
+        <p:nvSpPr>
+          <p:cNvPr id="23" name="Rectangle 22">
+            <a:extLst>
+              <a:ext uri="{FF2B5EF4-FFF2-40B4-BE49-F238E27FC236}">
+                <a16:creationId xmlns:a16="http://schemas.microsoft.com/office/drawing/2014/main" xmlns="" id="{EE1FC7B4-E4A7-4452-B413-1A623E3A7230}"/>
+              </a:ext>
+            </a:extLst>
+          </p:cNvPr>
+          <p:cNvSpPr>
+            <a:spLocks noGrp="1" noRot="1" noChangeAspect="1" noMove="1" noResize="1" noEditPoints="1" noAdjustHandles="1" noChangeArrowheads="1" noChangeShapeType="1" noTextEdit="1"/>
+          </p:cNvSpPr>
+          <p:nvPr>
+            <p:extLst>
+              <p:ext uri="{386F3935-93C4-4BCD-93E2-E3B085C9AB24}">
+                <p16:designElem xmlns:p16="http://schemas.microsoft.com/office/powerpoint/2015/main" xmlns="" val="1"/>
+              </p:ext>
+            </p:extLst>
+          </p:nvPr>
+        </p:nvSpPr>
+        <p:spPr>
+          <a:xfrm>
+            <a:off x="0" y="-3324"/>
+            <a:ext cx="12192000" cy="6861324"/>
+          </a:xfrm>
+          <a:prstGeom prst="rect">
+            <a:avLst/>
+          </a:prstGeom>
+          <a:solidFill>
+            <a:schemeClr val="bg1">
+              <a:alpha val="9000"/>
+            </a:schemeClr>
+          </a:solidFill>
+          <a:ln>
+            <a:noFill/>
+          </a:ln>
+        </p:spPr>
+        <p:style>
+          <a:lnRef idx="2">
+            <a:schemeClr val="accent1">
+              <a:shade val="50000"/>
+            </a:schemeClr>
+          </a:lnRef>
+          <a:fillRef idx="1">
+            <a:schemeClr val="accent1"/>
+          </a:fillRef>
+          <a:effectRef idx="0">
+            <a:schemeClr val="accent1"/>
+          </a:effectRef>
+          <a:fontRef idx="minor">
+            <a:schemeClr val="lt1"/>
+          </a:fontRef>
+        </p:style>
+        <p:txBody>
+          <a:bodyPr rtlCol="0" anchor="ctr"/>
+          <a:lstStyle/>
+          <a:p>
+            <a:pPr marL="0" marR="0" lvl="0" indent="0" algn="ctr" defTabSz="914400" rtl="0" eaLnBrk="1" fontAlgn="auto" latinLnBrk="0" hangingPunct="1">
+              <a:lnSpc>
+                <a:spcPct val="100000"/>
+              </a:lnSpc>
+              <a:spcBef>
+                <a:spcPts val="0"/>
+              </a:spcBef>
+              <a:spcAft>
+                <a:spcPts val="0"/>
+              </a:spcAft>
+              <a:buClrTx/>
+              <a:buSzTx/>
+              <a:buFontTx/>
+              <a:buNone/>
+              <a:tabLst/>
+              <a:defRPr/>
+            </a:pPr>
+            <a:endParaRPr kumimoji="0" lang="en-US" sz="1800" b="0" i="0" u="none" strike="noStrike" kern="1200" cap="none" spc="0" normalizeH="0" baseline="0" noProof="0">
+              <a:ln>
+                <a:noFill/>
+              </a:ln>
+              <a:solidFill>
+                <a:prstClr val="white"/>
+              </a:solidFill>
+              <a:effectLst/>
+              <a:uLnTx/>
+              <a:uFillTx/>
+              <a:latin typeface="Calibri" panose="020F0502020204030204"/>
+              <a:ea typeface="+mn-ea"/>
+              <a:cs typeface="+mn-cs"/>
+            </a:endParaRPr>
+          </a:p>
+        </p:txBody>
+      </p:sp>
+      <p:sp>
+        <p:nvSpPr>
+          <p:cNvPr id="25" name="Freeform 13">
+            <a:extLst>
+              <a:ext uri="{FF2B5EF4-FFF2-40B4-BE49-F238E27FC236}">
+                <a16:creationId xmlns:a16="http://schemas.microsoft.com/office/drawing/2014/main" xmlns="" id="{E0709AF0-24F0-4486-B189-BE6386BDB198}"/>
+              </a:ext>
+            </a:extLst>
+          </p:cNvPr>
+          <p:cNvSpPr>
+            <a:spLocks noGrp="1" noRot="1" noChangeAspect="1" noMove="1" noResize="1" noEditPoints="1" noAdjustHandles="1" noChangeArrowheads="1" noChangeShapeType="1" noTextEdit="1"/>
+          </p:cNvSpPr>
+          <p:nvPr>
+            <p:extLst>
+              <p:ext uri="{386F3935-93C4-4BCD-93E2-E3B085C9AB24}">
+                <p16:designElem xmlns:p16="http://schemas.microsoft.com/office/powerpoint/2015/main" xmlns="" val="1"/>
+              </p:ext>
+            </p:extLst>
+          </p:nvPr>
+        </p:nvSpPr>
+        <p:spPr>
+          <a:xfrm>
+            <a:off x="0" y="0"/>
+            <a:ext cx="11786754" cy="6858000"/>
+          </a:xfrm>
+          <a:custGeom>
+            <a:avLst/>
+            <a:gdLst>
+              <a:gd name="connsiteX0" fmla="*/ 0 w 11786754"/>
+              <a:gd name="connsiteY0" fmla="*/ 0 h 6858000"/>
+              <a:gd name="connsiteX1" fmla="*/ 8610600 w 11786754"/>
+              <a:gd name="connsiteY1" fmla="*/ 0 h 6858000"/>
+              <a:gd name="connsiteX2" fmla="*/ 11786754 w 11786754"/>
+              <a:gd name="connsiteY2" fmla="*/ 6858000 h 6858000"/>
+              <a:gd name="connsiteX3" fmla="*/ 0 w 11786754"/>
+              <a:gd name="connsiteY3" fmla="*/ 6858000 h 6858000"/>
+            </a:gdLst>
+            <a:ahLst/>
+            <a:cxnLst>
+              <a:cxn ang="0">
+                <a:pos x="connsiteX0" y="connsiteY0"/>
+              </a:cxn>
+              <a:cxn ang="0">
+                <a:pos x="connsiteX1" y="connsiteY1"/>
+              </a:cxn>
+              <a:cxn ang="0">
+                <a:pos x="connsiteX2" y="connsiteY2"/>
+              </a:cxn>
+              <a:cxn ang="0">
+                <a:pos x="connsiteX3" y="connsiteY3"/>
+              </a:cxn>
+            </a:cxnLst>
+            <a:rect l="l" t="t" r="r" b="b"/>
+            <a:pathLst>
+              <a:path w="11786754" h="6858000">
+                <a:moveTo>
+                  <a:pt x="0" y="0"/>
+                </a:moveTo>
+                <a:lnTo>
+                  <a:pt x="8610600" y="0"/>
+                </a:lnTo>
+                <a:lnTo>
+                  <a:pt x="11786754" y="6858000"/>
+                </a:lnTo>
+                <a:lnTo>
+                  <a:pt x="0" y="6858000"/>
+                </a:lnTo>
+                <a:close/>
+              </a:path>
+            </a:pathLst>
+          </a:custGeom>
+          <a:solidFill>
+            <a:schemeClr val="bg1">
+              <a:alpha val="30000"/>
+            </a:schemeClr>
+          </a:solidFill>
+          <a:ln>
+            <a:noFill/>
+          </a:ln>
+        </p:spPr>
+        <p:style>
+          <a:lnRef idx="2">
+            <a:schemeClr val="accent1">
+              <a:shade val="50000"/>
+            </a:schemeClr>
+          </a:lnRef>
+          <a:fillRef idx="1">
+            <a:schemeClr val="accent1"/>
+          </a:fillRef>
+          <a:effectRef idx="0">
+            <a:schemeClr val="accent1"/>
+          </a:effectRef>
+          <a:fontRef idx="minor">
+            <a:schemeClr val="lt1"/>
+          </a:fontRef>
+        </p:style>
+        <p:txBody>
+          <a:bodyPr rtlCol="0" anchor="ctr"/>
+          <a:lstStyle/>
+          <a:p>
+            <a:pPr marL="0" marR="0" lvl="0" indent="0" algn="ctr" defTabSz="914400" rtl="0" eaLnBrk="1" fontAlgn="auto" latinLnBrk="0" hangingPunct="1">
+              <a:lnSpc>
+                <a:spcPct val="100000"/>
+              </a:lnSpc>
+              <a:spcBef>
+                <a:spcPts val="0"/>
+              </a:spcBef>
+              <a:spcAft>
+                <a:spcPts val="0"/>
+              </a:spcAft>
+              <a:buClrTx/>
+              <a:buSzTx/>
+              <a:buFontTx/>
+              <a:buNone/>
+              <a:tabLst/>
+              <a:defRPr/>
+            </a:pPr>
+            <a:endParaRPr kumimoji="0" lang="en-US" sz="1800" b="0" i="0" u="none" strike="noStrike" kern="1200" cap="none" spc="0" normalizeH="0" baseline="0" noProof="0">
+              <a:ln>
+                <a:noFill/>
+              </a:ln>
+              <a:solidFill>
+                <a:prstClr val="white"/>
+              </a:solidFill>
+              <a:effectLst/>
+              <a:uLnTx/>
+              <a:uFillTx/>
+              <a:latin typeface="Calibri" panose="020F0502020204030204"/>
+              <a:ea typeface="+mn-ea"/>
+              <a:cs typeface="+mn-cs"/>
+            </a:endParaRPr>
+          </a:p>
+        </p:txBody>
+      </p:sp>
+      <p:sp>
+        <p:nvSpPr>
+          <p:cNvPr id="27" name="Freeform 11">
+            <a:extLst>
+              <a:ext uri="{FF2B5EF4-FFF2-40B4-BE49-F238E27FC236}">
+                <a16:creationId xmlns:a16="http://schemas.microsoft.com/office/drawing/2014/main" xmlns="" id="{FBE3B62F-5853-4A3C-B050-6186351A7176}"/>
+              </a:ext>
+            </a:extLst>
+          </p:cNvPr>
+          <p:cNvSpPr>
+            <a:spLocks noGrp="1" noRot="1" noChangeAspect="1" noMove="1" noResize="1" noEditPoints="1" noAdjustHandles="1" noChangeArrowheads="1" noChangeShapeType="1" noTextEdit="1"/>
+          </p:cNvSpPr>
+          <p:nvPr>
+            <p:extLst>
+              <p:ext uri="{386F3935-93C4-4BCD-93E2-E3B085C9AB24}">
+                <p16:designElem xmlns:p16="http://schemas.microsoft.com/office/powerpoint/2015/main" xmlns="" val="1"/>
+              </p:ext>
+            </p:extLst>
+          </p:nvPr>
+        </p:nvSpPr>
+        <p:spPr>
+          <a:xfrm>
+            <a:off x="0" y="0"/>
+            <a:ext cx="3581400" cy="6858000"/>
+          </a:xfrm>
+          <a:custGeom>
+            <a:avLst/>
+            <a:gdLst>
+              <a:gd name="connsiteX0" fmla="*/ 0 w 3581400"/>
+              <a:gd name="connsiteY0" fmla="*/ 0 h 6858000"/>
+              <a:gd name="connsiteX1" fmla="*/ 405246 w 3581400"/>
+              <a:gd name="connsiteY1" fmla="*/ 0 h 6858000"/>
+              <a:gd name="connsiteX2" fmla="*/ 3581400 w 3581400"/>
+              <a:gd name="connsiteY2" fmla="*/ 6858000 h 6858000"/>
+              <a:gd name="connsiteX3" fmla="*/ 0 w 3581400"/>
+              <a:gd name="connsiteY3" fmla="*/ 6858000 h 6858000"/>
+            </a:gdLst>
+            <a:ahLst/>
+            <a:cxnLst>
+              <a:cxn ang="0">
+                <a:pos x="connsiteX0" y="connsiteY0"/>
+              </a:cxn>
+              <a:cxn ang="0">
+                <a:pos x="connsiteX1" y="connsiteY1"/>
+              </a:cxn>
+              <a:cxn ang="0">
+                <a:pos x="connsiteX2" y="connsiteY2"/>
+              </a:cxn>
+              <a:cxn ang="0">
+                <a:pos x="connsiteX3" y="connsiteY3"/>
+              </a:cxn>
+            </a:cxnLst>
+            <a:rect l="l" t="t" r="r" b="b"/>
+            <a:pathLst>
+              <a:path w="3581400" h="6858000">
+                <a:moveTo>
+                  <a:pt x="0" y="0"/>
+                </a:moveTo>
+                <a:lnTo>
+                  <a:pt x="405246" y="0"/>
+                </a:lnTo>
+                <a:lnTo>
+                  <a:pt x="3581400" y="6858000"/>
+                </a:lnTo>
+                <a:lnTo>
+                  <a:pt x="0" y="6858000"/>
+                </a:lnTo>
+                <a:close/>
+              </a:path>
+            </a:pathLst>
+          </a:custGeom>
+          <a:solidFill>
+            <a:schemeClr val="bg1">
+              <a:alpha val="30000"/>
+            </a:schemeClr>
+          </a:solidFill>
+          <a:ln>
+            <a:noFill/>
+          </a:ln>
+        </p:spPr>
+        <p:style>
+          <a:lnRef idx="2">
+            <a:schemeClr val="accent1">
+              <a:shade val="50000"/>
+            </a:schemeClr>
+          </a:lnRef>
+          <a:fillRef idx="1">
+            <a:schemeClr val="accent1"/>
+          </a:fillRef>
+          <a:effectRef idx="0">
+            <a:schemeClr val="accent1"/>
+          </a:effectRef>
+          <a:fontRef idx="minor">
+            <a:schemeClr val="lt1"/>
+          </a:fontRef>
+        </p:style>
+        <p:txBody>
+          <a:bodyPr wrap="square" rtlCol="0" anchor="ctr">
+            <a:noAutofit/>
+          </a:bodyPr>
+          <a:lstStyle/>
+          <a:p>
+            <a:pPr marL="0" marR="0" lvl="0" indent="0" algn="ctr" defTabSz="914400" rtl="0" eaLnBrk="1" fontAlgn="auto" latinLnBrk="0" hangingPunct="1">
+              <a:lnSpc>
+                <a:spcPct val="100000"/>
+              </a:lnSpc>
+              <a:spcBef>
+                <a:spcPts val="0"/>
+              </a:spcBef>
+              <a:spcAft>
+                <a:spcPts val="0"/>
+              </a:spcAft>
+              <a:buClrTx/>
+              <a:buSzTx/>
+              <a:buFontTx/>
+              <a:buNone/>
+              <a:tabLst/>
+              <a:defRPr/>
+            </a:pPr>
+            <a:endParaRPr kumimoji="0" lang="en-US" sz="1800" b="0" i="0" u="none" strike="noStrike" kern="1200" cap="none" spc="0" normalizeH="0" baseline="0" noProof="0">
+              <a:ln>
+                <a:noFill/>
+              </a:ln>
+              <a:solidFill>
+                <a:prstClr val="white"/>
+              </a:solidFill>
+              <a:effectLst/>
+              <a:uLnTx/>
+              <a:uFillTx/>
+              <a:latin typeface="Calibri" panose="020F0502020204030204"/>
+              <a:ea typeface="+mn-ea"/>
+              <a:cs typeface="+mn-cs"/>
+            </a:endParaRPr>
+          </a:p>
+        </p:txBody>
+      </p:sp>
+      <p:pic>
+        <p:nvPicPr>
+          <p:cNvPr id="3" name="Picture 2"/>
+          <p:cNvPicPr>
+            <a:picLocks noChangeAspect="1"/>
+          </p:cNvPicPr>
+          <p:nvPr/>
+        </p:nvPicPr>
+        <p:blipFill>
+          <a:blip r:embed="rId2">
+            <a:extLst>
+              <a:ext uri="{28A0092B-C50C-407E-A947-70E740481C1C}">
+                <a14:useLocalDpi xmlns:a14="http://schemas.microsoft.com/office/drawing/2010/main" val="0"/>
+              </a:ext>
+            </a:extLst>
+          </a:blip>
+          <a:stretch>
+            <a:fillRect/>
+          </a:stretch>
+        </p:blipFill>
+        <p:spPr>
+          <a:xfrm>
+            <a:off x="2537916" y="723522"/>
+            <a:ext cx="7116168" cy="5410955"/>
+          </a:xfrm>
+          <a:prstGeom prst="rect">
+            <a:avLst/>
+          </a:prstGeom>
+        </p:spPr>
+      </p:pic>
     </p:spTree>
     <p:extLst>
       <p:ext uri="{BB962C8B-B14F-4D97-AF65-F5344CB8AC3E}">
         <p14:creationId xmlns:p14="http://schemas.microsoft.com/office/powerpoint/2010/main" val="3363929301"/>
+      </p:ext>
+    </p:extLst>
+  </p:cSld>
+  <p:clrMapOvr>
+    <a:overrideClrMapping bg1="dk1" tx1="lt1" bg2="dk2" tx2="lt2" accent1="accent1" accent2="accent2" accent3="accent3" accent4="accent4" accent5="accent5" accent6="accent6" hlink="hlink" folHlink="folHlink"/>
+  </p:clrMapOvr>
+  <p:timing>
+    <p:tnLst>
+      <p:par>
+        <p:cTn id="1" dur="indefinite" restart="never" nodeType="tmRoot"/>
+      </p:par>
+    </p:tnLst>
+  </p:timing>
+</p:sld>
+</file>
+
+<file path=ppt/slides/slide15.xml><?xml version="1.0" encoding="utf-8"?>
+<p:sld xmlns:a="http://schemas.openxmlformats.org/drawingml/2006/main" xmlns:r="http://schemas.openxmlformats.org/officeDocument/2006/relationships" xmlns:p="http://schemas.openxmlformats.org/presentationml/2006/main">
+  <p:cSld>
+    <p:bg>
+      <p:bgPr>
+        <a:solidFill>
+          <a:schemeClr val="bg1">
+            <a:tint val="95000"/>
+            <a:satMod val="170000"/>
+          </a:schemeClr>
+        </a:solidFill>
+        <a:effectLst/>
+      </p:bgPr>
+    </p:bg>
+    <p:spTree>
+      <p:nvGrpSpPr>
+        <p:cNvPr id="1" name=""/>
+        <p:cNvGrpSpPr/>
+        <p:nvPr/>
+      </p:nvGrpSpPr>
+      <p:grpSpPr>
+        <a:xfrm>
+          <a:off x="0" y="0"/>
+          <a:ext cx="0" cy="0"/>
+          <a:chOff x="0" y="0"/>
+          <a:chExt cx="0" cy="0"/>
+        </a:xfrm>
+      </p:grpSpPr>
+      <p:sp>
+        <p:nvSpPr>
+          <p:cNvPr id="23" name="Rectangle 22">
+            <a:extLst>
+              <a:ext uri="{FF2B5EF4-FFF2-40B4-BE49-F238E27FC236}">
+                <a16:creationId xmlns:a16="http://schemas.microsoft.com/office/drawing/2014/main" xmlns="" id="{EE1FC7B4-E4A7-4452-B413-1A623E3A7230}"/>
+              </a:ext>
+            </a:extLst>
+          </p:cNvPr>
+          <p:cNvSpPr>
+            <a:spLocks noGrp="1" noRot="1" noChangeAspect="1" noMove="1" noResize="1" noEditPoints="1" noAdjustHandles="1" noChangeArrowheads="1" noChangeShapeType="1" noTextEdit="1"/>
+          </p:cNvSpPr>
+          <p:nvPr>
+            <p:extLst>
+              <p:ext uri="{386F3935-93C4-4BCD-93E2-E3B085C9AB24}">
+                <p16:designElem xmlns:p16="http://schemas.microsoft.com/office/powerpoint/2015/main" xmlns="" val="1"/>
+              </p:ext>
+            </p:extLst>
+          </p:nvPr>
+        </p:nvSpPr>
+        <p:spPr>
+          <a:xfrm>
+            <a:off x="0" y="-3324"/>
+            <a:ext cx="12192000" cy="6861324"/>
+          </a:xfrm>
+          <a:prstGeom prst="rect">
+            <a:avLst/>
+          </a:prstGeom>
+          <a:solidFill>
+            <a:schemeClr val="bg1">
+              <a:alpha val="9000"/>
+            </a:schemeClr>
+          </a:solidFill>
+          <a:ln>
+            <a:noFill/>
+          </a:ln>
+        </p:spPr>
+        <p:style>
+          <a:lnRef idx="2">
+            <a:schemeClr val="accent1">
+              <a:shade val="50000"/>
+            </a:schemeClr>
+          </a:lnRef>
+          <a:fillRef idx="1">
+            <a:schemeClr val="accent1"/>
+          </a:fillRef>
+          <a:effectRef idx="0">
+            <a:schemeClr val="accent1"/>
+          </a:effectRef>
+          <a:fontRef idx="minor">
+            <a:schemeClr val="lt1"/>
+          </a:fontRef>
+        </p:style>
+        <p:txBody>
+          <a:bodyPr rtlCol="0" anchor="ctr"/>
+          <a:lstStyle/>
+          <a:p>
+            <a:pPr marL="0" marR="0" lvl="0" indent="0" algn="ctr" defTabSz="914400" rtl="0" eaLnBrk="1" fontAlgn="auto" latinLnBrk="0" hangingPunct="1">
+              <a:lnSpc>
+                <a:spcPct val="100000"/>
+              </a:lnSpc>
+              <a:spcBef>
+                <a:spcPts val="0"/>
+              </a:spcBef>
+              <a:spcAft>
+                <a:spcPts val="0"/>
+              </a:spcAft>
+              <a:buClrTx/>
+              <a:buSzTx/>
+              <a:buFontTx/>
+              <a:buNone/>
+              <a:tabLst/>
+              <a:defRPr/>
+            </a:pPr>
+            <a:endParaRPr kumimoji="0" lang="en-US" sz="1800" b="0" i="0" u="none" strike="noStrike" kern="1200" cap="none" spc="0" normalizeH="0" baseline="0" noProof="0">
+              <a:ln>
+                <a:noFill/>
+              </a:ln>
+              <a:solidFill>
+                <a:prstClr val="white"/>
+              </a:solidFill>
+              <a:effectLst/>
+              <a:uLnTx/>
+              <a:uFillTx/>
+              <a:latin typeface="Calibri" panose="020F0502020204030204"/>
+              <a:ea typeface="+mn-ea"/>
+              <a:cs typeface="+mn-cs"/>
+            </a:endParaRPr>
+          </a:p>
+        </p:txBody>
+      </p:sp>
+      <p:sp>
+        <p:nvSpPr>
+          <p:cNvPr id="25" name="Freeform 13">
+            <a:extLst>
+              <a:ext uri="{FF2B5EF4-FFF2-40B4-BE49-F238E27FC236}">
+                <a16:creationId xmlns:a16="http://schemas.microsoft.com/office/drawing/2014/main" xmlns="" id="{E0709AF0-24F0-4486-B189-BE6386BDB198}"/>
+              </a:ext>
+            </a:extLst>
+          </p:cNvPr>
+          <p:cNvSpPr>
+            <a:spLocks noGrp="1" noRot="1" noChangeAspect="1" noMove="1" noResize="1" noEditPoints="1" noAdjustHandles="1" noChangeArrowheads="1" noChangeShapeType="1" noTextEdit="1"/>
+          </p:cNvSpPr>
+          <p:nvPr>
+            <p:extLst>
+              <p:ext uri="{386F3935-93C4-4BCD-93E2-E3B085C9AB24}">
+                <p16:designElem xmlns:p16="http://schemas.microsoft.com/office/powerpoint/2015/main" xmlns="" val="1"/>
+              </p:ext>
+            </p:extLst>
+          </p:nvPr>
+        </p:nvSpPr>
+        <p:spPr>
+          <a:xfrm>
+            <a:off x="0" y="0"/>
+            <a:ext cx="11786754" cy="6858000"/>
+          </a:xfrm>
+          <a:custGeom>
+            <a:avLst/>
+            <a:gdLst>
+              <a:gd name="connsiteX0" fmla="*/ 0 w 11786754"/>
+              <a:gd name="connsiteY0" fmla="*/ 0 h 6858000"/>
+              <a:gd name="connsiteX1" fmla="*/ 8610600 w 11786754"/>
+              <a:gd name="connsiteY1" fmla="*/ 0 h 6858000"/>
+              <a:gd name="connsiteX2" fmla="*/ 11786754 w 11786754"/>
+              <a:gd name="connsiteY2" fmla="*/ 6858000 h 6858000"/>
+              <a:gd name="connsiteX3" fmla="*/ 0 w 11786754"/>
+              <a:gd name="connsiteY3" fmla="*/ 6858000 h 6858000"/>
+            </a:gdLst>
+            <a:ahLst/>
+            <a:cxnLst>
+              <a:cxn ang="0">
+                <a:pos x="connsiteX0" y="connsiteY0"/>
+              </a:cxn>
+              <a:cxn ang="0">
+                <a:pos x="connsiteX1" y="connsiteY1"/>
+              </a:cxn>
+              <a:cxn ang="0">
+                <a:pos x="connsiteX2" y="connsiteY2"/>
+              </a:cxn>
+              <a:cxn ang="0">
+                <a:pos x="connsiteX3" y="connsiteY3"/>
+              </a:cxn>
+            </a:cxnLst>
+            <a:rect l="l" t="t" r="r" b="b"/>
+            <a:pathLst>
+              <a:path w="11786754" h="6858000">
+                <a:moveTo>
+                  <a:pt x="0" y="0"/>
+                </a:moveTo>
+                <a:lnTo>
+                  <a:pt x="8610600" y="0"/>
+                </a:lnTo>
+                <a:lnTo>
+                  <a:pt x="11786754" y="6858000"/>
+                </a:lnTo>
+                <a:lnTo>
+                  <a:pt x="0" y="6858000"/>
+                </a:lnTo>
+                <a:close/>
+              </a:path>
+            </a:pathLst>
+          </a:custGeom>
+          <a:solidFill>
+            <a:schemeClr val="bg1">
+              <a:alpha val="30000"/>
+            </a:schemeClr>
+          </a:solidFill>
+          <a:ln>
+            <a:noFill/>
+          </a:ln>
+        </p:spPr>
+        <p:style>
+          <a:lnRef idx="2">
+            <a:schemeClr val="accent1">
+              <a:shade val="50000"/>
+            </a:schemeClr>
+          </a:lnRef>
+          <a:fillRef idx="1">
+            <a:schemeClr val="accent1"/>
+          </a:fillRef>
+          <a:effectRef idx="0">
+            <a:schemeClr val="accent1"/>
+          </a:effectRef>
+          <a:fontRef idx="minor">
+            <a:schemeClr val="lt1"/>
+          </a:fontRef>
+        </p:style>
+        <p:txBody>
+          <a:bodyPr rtlCol="0" anchor="ctr"/>
+          <a:lstStyle/>
+          <a:p>
+            <a:pPr marL="0" marR="0" lvl="0" indent="0" algn="ctr" defTabSz="914400" rtl="0" eaLnBrk="1" fontAlgn="auto" latinLnBrk="0" hangingPunct="1">
+              <a:lnSpc>
+                <a:spcPct val="100000"/>
+              </a:lnSpc>
+              <a:spcBef>
+                <a:spcPts val="0"/>
+              </a:spcBef>
+              <a:spcAft>
+                <a:spcPts val="0"/>
+              </a:spcAft>
+              <a:buClrTx/>
+              <a:buSzTx/>
+              <a:buFontTx/>
+              <a:buNone/>
+              <a:tabLst/>
+              <a:defRPr/>
+            </a:pPr>
+            <a:endParaRPr kumimoji="0" lang="en-US" sz="1800" b="0" i="0" u="none" strike="noStrike" kern="1200" cap="none" spc="0" normalizeH="0" baseline="0" noProof="0">
+              <a:ln>
+                <a:noFill/>
+              </a:ln>
+              <a:solidFill>
+                <a:prstClr val="white"/>
+              </a:solidFill>
+              <a:effectLst/>
+              <a:uLnTx/>
+              <a:uFillTx/>
+              <a:latin typeface="Calibri" panose="020F0502020204030204"/>
+              <a:ea typeface="+mn-ea"/>
+              <a:cs typeface="+mn-cs"/>
+            </a:endParaRPr>
+          </a:p>
+        </p:txBody>
+      </p:sp>
+      <p:sp>
+        <p:nvSpPr>
+          <p:cNvPr id="27" name="Freeform 11">
+            <a:extLst>
+              <a:ext uri="{FF2B5EF4-FFF2-40B4-BE49-F238E27FC236}">
+                <a16:creationId xmlns:a16="http://schemas.microsoft.com/office/drawing/2014/main" xmlns="" id="{FBE3B62F-5853-4A3C-B050-6186351A7176}"/>
+              </a:ext>
+            </a:extLst>
+          </p:cNvPr>
+          <p:cNvSpPr>
+            <a:spLocks noGrp="1" noRot="1" noChangeAspect="1" noMove="1" noResize="1" noEditPoints="1" noAdjustHandles="1" noChangeArrowheads="1" noChangeShapeType="1" noTextEdit="1"/>
+          </p:cNvSpPr>
+          <p:nvPr>
+            <p:extLst>
+              <p:ext uri="{386F3935-93C4-4BCD-93E2-E3B085C9AB24}">
+                <p16:designElem xmlns:p16="http://schemas.microsoft.com/office/powerpoint/2015/main" xmlns="" val="1"/>
+              </p:ext>
+            </p:extLst>
+          </p:nvPr>
+        </p:nvSpPr>
+        <p:spPr>
+          <a:xfrm>
+            <a:off x="0" y="0"/>
+            <a:ext cx="3581400" cy="6858000"/>
+          </a:xfrm>
+          <a:custGeom>
+            <a:avLst/>
+            <a:gdLst>
+              <a:gd name="connsiteX0" fmla="*/ 0 w 3581400"/>
+              <a:gd name="connsiteY0" fmla="*/ 0 h 6858000"/>
+              <a:gd name="connsiteX1" fmla="*/ 405246 w 3581400"/>
+              <a:gd name="connsiteY1" fmla="*/ 0 h 6858000"/>
+              <a:gd name="connsiteX2" fmla="*/ 3581400 w 3581400"/>
+              <a:gd name="connsiteY2" fmla="*/ 6858000 h 6858000"/>
+              <a:gd name="connsiteX3" fmla="*/ 0 w 3581400"/>
+              <a:gd name="connsiteY3" fmla="*/ 6858000 h 6858000"/>
+            </a:gdLst>
+            <a:ahLst/>
+            <a:cxnLst>
+              <a:cxn ang="0">
+                <a:pos x="connsiteX0" y="connsiteY0"/>
+              </a:cxn>
+              <a:cxn ang="0">
+                <a:pos x="connsiteX1" y="connsiteY1"/>
+              </a:cxn>
+              <a:cxn ang="0">
+                <a:pos x="connsiteX2" y="connsiteY2"/>
+              </a:cxn>
+              <a:cxn ang="0">
+                <a:pos x="connsiteX3" y="connsiteY3"/>
+              </a:cxn>
+            </a:cxnLst>
+            <a:rect l="l" t="t" r="r" b="b"/>
+            <a:pathLst>
+              <a:path w="3581400" h="6858000">
+                <a:moveTo>
+                  <a:pt x="0" y="0"/>
+                </a:moveTo>
+                <a:lnTo>
+                  <a:pt x="405246" y="0"/>
+                </a:lnTo>
+                <a:lnTo>
+                  <a:pt x="3581400" y="6858000"/>
+                </a:lnTo>
+                <a:lnTo>
+                  <a:pt x="0" y="6858000"/>
+                </a:lnTo>
+                <a:close/>
+              </a:path>
+            </a:pathLst>
+          </a:custGeom>
+          <a:solidFill>
+            <a:schemeClr val="bg1">
+              <a:alpha val="30000"/>
+            </a:schemeClr>
+          </a:solidFill>
+          <a:ln>
+            <a:noFill/>
+          </a:ln>
+        </p:spPr>
+        <p:style>
+          <a:lnRef idx="2">
+            <a:schemeClr val="accent1">
+              <a:shade val="50000"/>
+            </a:schemeClr>
+          </a:lnRef>
+          <a:fillRef idx="1">
+            <a:schemeClr val="accent1"/>
+          </a:fillRef>
+          <a:effectRef idx="0">
+            <a:schemeClr val="accent1"/>
+          </a:effectRef>
+          <a:fontRef idx="minor">
+            <a:schemeClr val="lt1"/>
+          </a:fontRef>
+        </p:style>
+        <p:txBody>
+          <a:bodyPr wrap="square" rtlCol="0" anchor="ctr">
+            <a:noAutofit/>
+          </a:bodyPr>
+          <a:lstStyle/>
+          <a:p>
+            <a:pPr marL="0" marR="0" lvl="0" indent="0" algn="ctr" defTabSz="914400" rtl="0" eaLnBrk="1" fontAlgn="auto" latinLnBrk="0" hangingPunct="1">
+              <a:lnSpc>
+                <a:spcPct val="100000"/>
+              </a:lnSpc>
+              <a:spcBef>
+                <a:spcPts val="0"/>
+              </a:spcBef>
+              <a:spcAft>
+                <a:spcPts val="0"/>
+              </a:spcAft>
+              <a:buClrTx/>
+              <a:buSzTx/>
+              <a:buFontTx/>
+              <a:buNone/>
+              <a:tabLst/>
+              <a:defRPr/>
+            </a:pPr>
+            <a:endParaRPr kumimoji="0" lang="en-US" sz="1800" b="0" i="0" u="none" strike="noStrike" kern="1200" cap="none" spc="0" normalizeH="0" baseline="0" noProof="0">
+              <a:ln>
+                <a:noFill/>
+              </a:ln>
+              <a:solidFill>
+                <a:prstClr val="white"/>
+              </a:solidFill>
+              <a:effectLst/>
+              <a:uLnTx/>
+              <a:uFillTx/>
+              <a:latin typeface="Calibri" panose="020F0502020204030204"/>
+              <a:ea typeface="+mn-ea"/>
+              <a:cs typeface="+mn-cs"/>
+            </a:endParaRPr>
+          </a:p>
+        </p:txBody>
+      </p:sp>
+      <p:pic>
+        <p:nvPicPr>
+          <p:cNvPr id="2" name="Picture 1"/>
+          <p:cNvPicPr>
+            <a:picLocks noChangeAspect="1"/>
+          </p:cNvPicPr>
+          <p:nvPr/>
+        </p:nvPicPr>
+        <p:blipFill>
+          <a:blip r:embed="rId2">
+            <a:extLst>
+              <a:ext uri="{28A0092B-C50C-407E-A947-70E740481C1C}">
+                <a14:useLocalDpi xmlns:a14="http://schemas.microsoft.com/office/drawing/2010/main" val="0"/>
+              </a:ext>
+            </a:extLst>
+          </a:blip>
+          <a:stretch>
+            <a:fillRect/>
+          </a:stretch>
+        </p:blipFill>
+        <p:spPr>
+          <a:xfrm>
+            <a:off x="1574341" y="466882"/>
+            <a:ext cx="9043318" cy="5920912"/>
+          </a:xfrm>
+          <a:prstGeom prst="rect">
+            <a:avLst/>
+          </a:prstGeom>
+        </p:spPr>
+      </p:pic>
+    </p:spTree>
+    <p:extLst>
+      <p:ext uri="{BB962C8B-B14F-4D97-AF65-F5344CB8AC3E}">
+        <p14:creationId xmlns:p14="http://schemas.microsoft.com/office/powerpoint/2010/main" val="834802163"/>
+      </p:ext>
+    </p:extLst>
+  </p:cSld>
+  <p:clrMapOvr>
+    <a:overrideClrMapping bg1="dk1" tx1="lt1" bg2="dk2" tx2="lt2" accent1="accent1" accent2="accent2" accent3="accent3" accent4="accent4" accent5="accent5" accent6="accent6" hlink="hlink" folHlink="folHlink"/>
+  </p:clrMapOvr>
+  <p:timing>
+    <p:tnLst>
+      <p:par>
+        <p:cTn id="1" dur="indefinite" restart="never" nodeType="tmRoot"/>
+      </p:par>
+    </p:tnLst>
+  </p:timing>
+</p:sld>
+</file>
+
+<file path=ppt/slides/slide16.xml><?xml version="1.0" encoding="utf-8"?>
+<p:sld xmlns:a="http://schemas.openxmlformats.org/drawingml/2006/main" xmlns:r="http://schemas.openxmlformats.org/officeDocument/2006/relationships" xmlns:p="http://schemas.openxmlformats.org/presentationml/2006/main">
+  <p:cSld>
+    <p:bg>
+      <p:bgPr>
+        <a:solidFill>
+          <a:schemeClr val="bg1">
+            <a:tint val="95000"/>
+            <a:satMod val="170000"/>
+          </a:schemeClr>
+        </a:solidFill>
+        <a:effectLst/>
+      </p:bgPr>
+    </p:bg>
+    <p:spTree>
+      <p:nvGrpSpPr>
+        <p:cNvPr id="1" name=""/>
+        <p:cNvGrpSpPr/>
+        <p:nvPr/>
+      </p:nvGrpSpPr>
+      <p:grpSpPr>
+        <a:xfrm>
+          <a:off x="0" y="0"/>
+          <a:ext cx="0" cy="0"/>
+          <a:chOff x="0" y="0"/>
+          <a:chExt cx="0" cy="0"/>
+        </a:xfrm>
+      </p:grpSpPr>
+      <p:sp>
+        <p:nvSpPr>
+          <p:cNvPr id="23" name="Rectangle 22">
+            <a:extLst>
+              <a:ext uri="{FF2B5EF4-FFF2-40B4-BE49-F238E27FC236}">
+                <a16:creationId xmlns:a16="http://schemas.microsoft.com/office/drawing/2014/main" xmlns="" id="{EE1FC7B4-E4A7-4452-B413-1A623E3A7230}"/>
+              </a:ext>
+            </a:extLst>
+          </p:cNvPr>
+          <p:cNvSpPr>
+            <a:spLocks noGrp="1" noRot="1" noChangeAspect="1" noMove="1" noResize="1" noEditPoints="1" noAdjustHandles="1" noChangeArrowheads="1" noChangeShapeType="1" noTextEdit="1"/>
+          </p:cNvSpPr>
+          <p:nvPr>
+            <p:extLst>
+              <p:ext uri="{386F3935-93C4-4BCD-93E2-E3B085C9AB24}">
+                <p16:designElem xmlns:p16="http://schemas.microsoft.com/office/powerpoint/2015/main" xmlns="" val="1"/>
+              </p:ext>
+            </p:extLst>
+          </p:nvPr>
+        </p:nvSpPr>
+        <p:spPr>
+          <a:xfrm>
+            <a:off x="0" y="-3324"/>
+            <a:ext cx="12192000" cy="6861324"/>
+          </a:xfrm>
+          <a:prstGeom prst="rect">
+            <a:avLst/>
+          </a:prstGeom>
+          <a:solidFill>
+            <a:schemeClr val="bg1">
+              <a:alpha val="9000"/>
+            </a:schemeClr>
+          </a:solidFill>
+          <a:ln>
+            <a:noFill/>
+          </a:ln>
+        </p:spPr>
+        <p:style>
+          <a:lnRef idx="2">
+            <a:schemeClr val="accent1">
+              <a:shade val="50000"/>
+            </a:schemeClr>
+          </a:lnRef>
+          <a:fillRef idx="1">
+            <a:schemeClr val="accent1"/>
+          </a:fillRef>
+          <a:effectRef idx="0">
+            <a:schemeClr val="accent1"/>
+          </a:effectRef>
+          <a:fontRef idx="minor">
+            <a:schemeClr val="lt1"/>
+          </a:fontRef>
+        </p:style>
+        <p:txBody>
+          <a:bodyPr rtlCol="0" anchor="ctr"/>
+          <a:lstStyle/>
+          <a:p>
+            <a:pPr marL="0" marR="0" lvl="0" indent="0" algn="ctr" defTabSz="914400" rtl="0" eaLnBrk="1" fontAlgn="auto" latinLnBrk="0" hangingPunct="1">
+              <a:lnSpc>
+                <a:spcPct val="100000"/>
+              </a:lnSpc>
+              <a:spcBef>
+                <a:spcPts val="0"/>
+              </a:spcBef>
+              <a:spcAft>
+                <a:spcPts val="0"/>
+              </a:spcAft>
+              <a:buClrTx/>
+              <a:buSzTx/>
+              <a:buFontTx/>
+              <a:buNone/>
+              <a:tabLst/>
+              <a:defRPr/>
+            </a:pPr>
+            <a:endParaRPr kumimoji="0" lang="en-US" sz="1800" b="0" i="0" u="none" strike="noStrike" kern="1200" cap="none" spc="0" normalizeH="0" baseline="0" noProof="0">
+              <a:ln>
+                <a:noFill/>
+              </a:ln>
+              <a:solidFill>
+                <a:prstClr val="white"/>
+              </a:solidFill>
+              <a:effectLst/>
+              <a:uLnTx/>
+              <a:uFillTx/>
+              <a:latin typeface="Calibri" panose="020F0502020204030204"/>
+              <a:ea typeface="+mn-ea"/>
+              <a:cs typeface="+mn-cs"/>
+            </a:endParaRPr>
+          </a:p>
+        </p:txBody>
+      </p:sp>
+      <p:sp>
+        <p:nvSpPr>
+          <p:cNvPr id="25" name="Freeform 13">
+            <a:extLst>
+              <a:ext uri="{FF2B5EF4-FFF2-40B4-BE49-F238E27FC236}">
+                <a16:creationId xmlns:a16="http://schemas.microsoft.com/office/drawing/2014/main" xmlns="" id="{E0709AF0-24F0-4486-B189-BE6386BDB198}"/>
+              </a:ext>
+            </a:extLst>
+          </p:cNvPr>
+          <p:cNvSpPr>
+            <a:spLocks noGrp="1" noRot="1" noChangeAspect="1" noMove="1" noResize="1" noEditPoints="1" noAdjustHandles="1" noChangeArrowheads="1" noChangeShapeType="1" noTextEdit="1"/>
+          </p:cNvSpPr>
+          <p:nvPr>
+            <p:extLst>
+              <p:ext uri="{386F3935-93C4-4BCD-93E2-E3B085C9AB24}">
+                <p16:designElem xmlns:p16="http://schemas.microsoft.com/office/powerpoint/2015/main" xmlns="" val="1"/>
+              </p:ext>
+            </p:extLst>
+          </p:nvPr>
+        </p:nvSpPr>
+        <p:spPr>
+          <a:xfrm>
+            <a:off x="0" y="0"/>
+            <a:ext cx="11786754" cy="6858000"/>
+          </a:xfrm>
+          <a:custGeom>
+            <a:avLst/>
+            <a:gdLst>
+              <a:gd name="connsiteX0" fmla="*/ 0 w 11786754"/>
+              <a:gd name="connsiteY0" fmla="*/ 0 h 6858000"/>
+              <a:gd name="connsiteX1" fmla="*/ 8610600 w 11786754"/>
+              <a:gd name="connsiteY1" fmla="*/ 0 h 6858000"/>
+              <a:gd name="connsiteX2" fmla="*/ 11786754 w 11786754"/>
+              <a:gd name="connsiteY2" fmla="*/ 6858000 h 6858000"/>
+              <a:gd name="connsiteX3" fmla="*/ 0 w 11786754"/>
+              <a:gd name="connsiteY3" fmla="*/ 6858000 h 6858000"/>
+            </a:gdLst>
+            <a:ahLst/>
+            <a:cxnLst>
+              <a:cxn ang="0">
+                <a:pos x="connsiteX0" y="connsiteY0"/>
+              </a:cxn>
+              <a:cxn ang="0">
+                <a:pos x="connsiteX1" y="connsiteY1"/>
+              </a:cxn>
+              <a:cxn ang="0">
+                <a:pos x="connsiteX2" y="connsiteY2"/>
+              </a:cxn>
+              <a:cxn ang="0">
+                <a:pos x="connsiteX3" y="connsiteY3"/>
+              </a:cxn>
+            </a:cxnLst>
+            <a:rect l="l" t="t" r="r" b="b"/>
+            <a:pathLst>
+              <a:path w="11786754" h="6858000">
+                <a:moveTo>
+                  <a:pt x="0" y="0"/>
+                </a:moveTo>
+                <a:lnTo>
+                  <a:pt x="8610600" y="0"/>
+                </a:lnTo>
+                <a:lnTo>
+                  <a:pt x="11786754" y="6858000"/>
+                </a:lnTo>
+                <a:lnTo>
+                  <a:pt x="0" y="6858000"/>
+                </a:lnTo>
+                <a:close/>
+              </a:path>
+            </a:pathLst>
+          </a:custGeom>
+          <a:solidFill>
+            <a:schemeClr val="bg1">
+              <a:alpha val="30000"/>
+            </a:schemeClr>
+          </a:solidFill>
+          <a:ln>
+            <a:noFill/>
+          </a:ln>
+        </p:spPr>
+        <p:style>
+          <a:lnRef idx="2">
+            <a:schemeClr val="accent1">
+              <a:shade val="50000"/>
+            </a:schemeClr>
+          </a:lnRef>
+          <a:fillRef idx="1">
+            <a:schemeClr val="accent1"/>
+          </a:fillRef>
+          <a:effectRef idx="0">
+            <a:schemeClr val="accent1"/>
+          </a:effectRef>
+          <a:fontRef idx="minor">
+            <a:schemeClr val="lt1"/>
+          </a:fontRef>
+        </p:style>
+        <p:txBody>
+          <a:bodyPr rtlCol="0" anchor="ctr"/>
+          <a:lstStyle/>
+          <a:p>
+            <a:pPr marL="0" marR="0" lvl="0" indent="0" algn="ctr" defTabSz="914400" rtl="0" eaLnBrk="1" fontAlgn="auto" latinLnBrk="0" hangingPunct="1">
+              <a:lnSpc>
+                <a:spcPct val="100000"/>
+              </a:lnSpc>
+              <a:spcBef>
+                <a:spcPts val="0"/>
+              </a:spcBef>
+              <a:spcAft>
+                <a:spcPts val="0"/>
+              </a:spcAft>
+              <a:buClrTx/>
+              <a:buSzTx/>
+              <a:buFontTx/>
+              <a:buNone/>
+              <a:tabLst/>
+              <a:defRPr/>
+            </a:pPr>
+            <a:endParaRPr kumimoji="0" lang="en-US" sz="1800" b="0" i="0" u="none" strike="noStrike" kern="1200" cap="none" spc="0" normalizeH="0" baseline="0" noProof="0">
+              <a:ln>
+                <a:noFill/>
+              </a:ln>
+              <a:solidFill>
+                <a:prstClr val="white"/>
+              </a:solidFill>
+              <a:effectLst/>
+              <a:uLnTx/>
+              <a:uFillTx/>
+              <a:latin typeface="Calibri" panose="020F0502020204030204"/>
+              <a:ea typeface="+mn-ea"/>
+              <a:cs typeface="+mn-cs"/>
+            </a:endParaRPr>
+          </a:p>
+        </p:txBody>
+      </p:sp>
+      <p:sp>
+        <p:nvSpPr>
+          <p:cNvPr id="27" name="Freeform 11">
+            <a:extLst>
+              <a:ext uri="{FF2B5EF4-FFF2-40B4-BE49-F238E27FC236}">
+                <a16:creationId xmlns:a16="http://schemas.microsoft.com/office/drawing/2014/main" xmlns="" id="{FBE3B62F-5853-4A3C-B050-6186351A7176}"/>
+              </a:ext>
+            </a:extLst>
+          </p:cNvPr>
+          <p:cNvSpPr>
+            <a:spLocks noGrp="1" noRot="1" noChangeAspect="1" noMove="1" noResize="1" noEditPoints="1" noAdjustHandles="1" noChangeArrowheads="1" noChangeShapeType="1" noTextEdit="1"/>
+          </p:cNvSpPr>
+          <p:nvPr>
+            <p:extLst>
+              <p:ext uri="{386F3935-93C4-4BCD-93E2-E3B085C9AB24}">
+                <p16:designElem xmlns:p16="http://schemas.microsoft.com/office/powerpoint/2015/main" xmlns="" val="1"/>
+              </p:ext>
+            </p:extLst>
+          </p:nvPr>
+        </p:nvSpPr>
+        <p:spPr>
+          <a:xfrm>
+            <a:off x="0" y="0"/>
+            <a:ext cx="3581400" cy="6858000"/>
+          </a:xfrm>
+          <a:custGeom>
+            <a:avLst/>
+            <a:gdLst>
+              <a:gd name="connsiteX0" fmla="*/ 0 w 3581400"/>
+              <a:gd name="connsiteY0" fmla="*/ 0 h 6858000"/>
+              <a:gd name="connsiteX1" fmla="*/ 405246 w 3581400"/>
+              <a:gd name="connsiteY1" fmla="*/ 0 h 6858000"/>
+              <a:gd name="connsiteX2" fmla="*/ 3581400 w 3581400"/>
+              <a:gd name="connsiteY2" fmla="*/ 6858000 h 6858000"/>
+              <a:gd name="connsiteX3" fmla="*/ 0 w 3581400"/>
+              <a:gd name="connsiteY3" fmla="*/ 6858000 h 6858000"/>
+            </a:gdLst>
+            <a:ahLst/>
+            <a:cxnLst>
+              <a:cxn ang="0">
+                <a:pos x="connsiteX0" y="connsiteY0"/>
+              </a:cxn>
+              <a:cxn ang="0">
+                <a:pos x="connsiteX1" y="connsiteY1"/>
+              </a:cxn>
+              <a:cxn ang="0">
+                <a:pos x="connsiteX2" y="connsiteY2"/>
+              </a:cxn>
+              <a:cxn ang="0">
+                <a:pos x="connsiteX3" y="connsiteY3"/>
+              </a:cxn>
+            </a:cxnLst>
+            <a:rect l="l" t="t" r="r" b="b"/>
+            <a:pathLst>
+              <a:path w="3581400" h="6858000">
+                <a:moveTo>
+                  <a:pt x="0" y="0"/>
+                </a:moveTo>
+                <a:lnTo>
+                  <a:pt x="405246" y="0"/>
+                </a:lnTo>
+                <a:lnTo>
+                  <a:pt x="3581400" y="6858000"/>
+                </a:lnTo>
+                <a:lnTo>
+                  <a:pt x="0" y="6858000"/>
+                </a:lnTo>
+                <a:close/>
+              </a:path>
+            </a:pathLst>
+          </a:custGeom>
+          <a:solidFill>
+            <a:schemeClr val="bg1">
+              <a:alpha val="30000"/>
+            </a:schemeClr>
+          </a:solidFill>
+          <a:ln>
+            <a:noFill/>
+          </a:ln>
+        </p:spPr>
+        <p:style>
+          <a:lnRef idx="2">
+            <a:schemeClr val="accent1">
+              <a:shade val="50000"/>
+            </a:schemeClr>
+          </a:lnRef>
+          <a:fillRef idx="1">
+            <a:schemeClr val="accent1"/>
+          </a:fillRef>
+          <a:effectRef idx="0">
+            <a:schemeClr val="accent1"/>
+          </a:effectRef>
+          <a:fontRef idx="minor">
+            <a:schemeClr val="lt1"/>
+          </a:fontRef>
+        </p:style>
+        <p:txBody>
+          <a:bodyPr wrap="square" rtlCol="0" anchor="ctr">
+            <a:noAutofit/>
+          </a:bodyPr>
+          <a:lstStyle/>
+          <a:p>
+            <a:pPr marL="0" marR="0" lvl="0" indent="0" algn="ctr" defTabSz="914400" rtl="0" eaLnBrk="1" fontAlgn="auto" latinLnBrk="0" hangingPunct="1">
+              <a:lnSpc>
+                <a:spcPct val="100000"/>
+              </a:lnSpc>
+              <a:spcBef>
+                <a:spcPts val="0"/>
+              </a:spcBef>
+              <a:spcAft>
+                <a:spcPts val="0"/>
+              </a:spcAft>
+              <a:buClrTx/>
+              <a:buSzTx/>
+              <a:buFontTx/>
+              <a:buNone/>
+              <a:tabLst/>
+              <a:defRPr/>
+            </a:pPr>
+            <a:endParaRPr kumimoji="0" lang="en-US" sz="1800" b="0" i="0" u="none" strike="noStrike" kern="1200" cap="none" spc="0" normalizeH="0" baseline="0" noProof="0">
+              <a:ln>
+                <a:noFill/>
+              </a:ln>
+              <a:solidFill>
+                <a:prstClr val="white"/>
+              </a:solidFill>
+              <a:effectLst/>
+              <a:uLnTx/>
+              <a:uFillTx/>
+              <a:latin typeface="Calibri" panose="020F0502020204030204"/>
+              <a:ea typeface="+mn-ea"/>
+              <a:cs typeface="+mn-cs"/>
+            </a:endParaRPr>
+          </a:p>
+        </p:txBody>
+      </p:sp>
+      <p:pic>
+        <p:nvPicPr>
+          <p:cNvPr id="3" name="Picture 2"/>
+          <p:cNvPicPr>
+            <a:picLocks noChangeAspect="1"/>
+          </p:cNvPicPr>
+          <p:nvPr/>
+        </p:nvPicPr>
+        <p:blipFill>
+          <a:blip r:embed="rId2">
+            <a:extLst>
+              <a:ext uri="{28A0092B-C50C-407E-A947-70E740481C1C}">
+                <a14:useLocalDpi xmlns:a14="http://schemas.microsoft.com/office/drawing/2010/main" val="0"/>
+              </a:ext>
+            </a:extLst>
+          </a:blip>
+          <a:stretch>
+            <a:fillRect/>
+          </a:stretch>
+        </p:blipFill>
+        <p:spPr>
+          <a:xfrm>
+            <a:off x="2478705" y="2409372"/>
+            <a:ext cx="6817619" cy="2522820"/>
+          </a:xfrm>
+          <a:prstGeom prst="rect">
+            <a:avLst/>
+          </a:prstGeom>
+        </p:spPr>
+      </p:pic>
+    </p:spTree>
+    <p:extLst>
+      <p:ext uri="{BB962C8B-B14F-4D97-AF65-F5344CB8AC3E}">
+        <p14:creationId xmlns:p14="http://schemas.microsoft.com/office/powerpoint/2010/main" val="1357941972"/>
       </p:ext>
     </p:extLst>
   </p:cSld>

</xml_diff>